<commit_message>
Add directory class and add ExportExcel Command test, add Export Excel Command Parser, add read Excel fiile (has not been created fully), modify the file util, modify the date util
</commit_message>
<xml_diff>
--- a/docs/diagrams/DeleteByDateEntrySequenceDiagram.pptx
+++ b/docs/diagrams/DeleteByDateEntrySequenceDiagram.pptx
@@ -104,6 +104,11 @@
       </a:defRPr>
     </a:lvl9pPr>
   </p:defaultTextStyle>
+  <p:extLst>
+    <p:ext uri="{EFAFB233-063F-42B5-8137-9DF3F51BA10A}">
+      <p15:sldGuideLst xmlns:p15="http://schemas.microsoft.com/office/powerpoint/2012/main"/>
+    </p:ext>
+  </p:extLst>
 </p:presentation>
 </file>
 
@@ -254,7 +259,7 @@
           <a:p>
             <a:fld id="{1266803A-6250-40E1-AD84-D83EECB9964B}" type="datetimeFigureOut">
               <a:rPr lang="en-US" smtClean="0"/>
-              <a:t>18-Oct-18</a:t>
+              <a:t>19-Oct-18</a:t>
             </a:fld>
             <a:endParaRPr lang="en-US"/>
           </a:p>
@@ -452,7 +457,7 @@
           <a:p>
             <a:fld id="{1266803A-6250-40E1-AD84-D83EECB9964B}" type="datetimeFigureOut">
               <a:rPr lang="en-US" smtClean="0"/>
-              <a:t>18-Oct-18</a:t>
+              <a:t>19-Oct-18</a:t>
             </a:fld>
             <a:endParaRPr lang="en-US"/>
           </a:p>
@@ -660,7 +665,7 @@
           <a:p>
             <a:fld id="{1266803A-6250-40E1-AD84-D83EECB9964B}" type="datetimeFigureOut">
               <a:rPr lang="en-US" smtClean="0"/>
-              <a:t>18-Oct-18</a:t>
+              <a:t>19-Oct-18</a:t>
             </a:fld>
             <a:endParaRPr lang="en-US"/>
           </a:p>
@@ -858,7 +863,7 @@
           <a:p>
             <a:fld id="{1266803A-6250-40E1-AD84-D83EECB9964B}" type="datetimeFigureOut">
               <a:rPr lang="en-US" smtClean="0"/>
-              <a:t>18-Oct-18</a:t>
+              <a:t>19-Oct-18</a:t>
             </a:fld>
             <a:endParaRPr lang="en-US"/>
           </a:p>
@@ -1133,7 +1138,7 @@
           <a:p>
             <a:fld id="{1266803A-6250-40E1-AD84-D83EECB9964B}" type="datetimeFigureOut">
               <a:rPr lang="en-US" smtClean="0"/>
-              <a:t>18-Oct-18</a:t>
+              <a:t>19-Oct-18</a:t>
             </a:fld>
             <a:endParaRPr lang="en-US"/>
           </a:p>
@@ -1398,7 +1403,7 @@
           <a:p>
             <a:fld id="{1266803A-6250-40E1-AD84-D83EECB9964B}" type="datetimeFigureOut">
               <a:rPr lang="en-US" smtClean="0"/>
-              <a:t>18-Oct-18</a:t>
+              <a:t>19-Oct-18</a:t>
             </a:fld>
             <a:endParaRPr lang="en-US"/>
           </a:p>
@@ -1810,7 +1815,7 @@
           <a:p>
             <a:fld id="{1266803A-6250-40E1-AD84-D83EECB9964B}" type="datetimeFigureOut">
               <a:rPr lang="en-US" smtClean="0"/>
-              <a:t>18-Oct-18</a:t>
+              <a:t>19-Oct-18</a:t>
             </a:fld>
             <a:endParaRPr lang="en-US"/>
           </a:p>
@@ -1951,7 +1956,7 @@
           <a:p>
             <a:fld id="{1266803A-6250-40E1-AD84-D83EECB9964B}" type="datetimeFigureOut">
               <a:rPr lang="en-US" smtClean="0"/>
-              <a:t>18-Oct-18</a:t>
+              <a:t>19-Oct-18</a:t>
             </a:fld>
             <a:endParaRPr lang="en-US"/>
           </a:p>
@@ -2064,7 +2069,7 @@
           <a:p>
             <a:fld id="{1266803A-6250-40E1-AD84-D83EECB9964B}" type="datetimeFigureOut">
               <a:rPr lang="en-US" smtClean="0"/>
-              <a:t>18-Oct-18</a:t>
+              <a:t>19-Oct-18</a:t>
             </a:fld>
             <a:endParaRPr lang="en-US"/>
           </a:p>
@@ -2375,7 +2380,7 @@
           <a:p>
             <a:fld id="{1266803A-6250-40E1-AD84-D83EECB9964B}" type="datetimeFigureOut">
               <a:rPr lang="en-US" smtClean="0"/>
-              <a:t>18-Oct-18</a:t>
+              <a:t>19-Oct-18</a:t>
             </a:fld>
             <a:endParaRPr lang="en-US"/>
           </a:p>
@@ -2663,7 +2668,7 @@
           <a:p>
             <a:fld id="{1266803A-6250-40E1-AD84-D83EECB9964B}" type="datetimeFigureOut">
               <a:rPr lang="en-US" smtClean="0"/>
-              <a:t>18-Oct-18</a:t>
+              <a:t>19-Oct-18</a:t>
             </a:fld>
             <a:endParaRPr lang="en-US"/>
           </a:p>
@@ -2904,7 +2909,7 @@
           <a:p>
             <a:fld id="{1266803A-6250-40E1-AD84-D83EECB9964B}" type="datetimeFigureOut">
               <a:rPr lang="en-US" smtClean="0"/>
-              <a:t>18-Oct-18</a:t>
+              <a:t>19-Oct-18</a:t>
             </a:fld>
             <a:endParaRPr lang="en-US"/>
           </a:p>
@@ -3335,7 +3340,7 @@
         </p:nvSpPr>
         <p:spPr>
           <a:xfrm>
-            <a:off x="7204819" y="69826"/>
+            <a:off x="10506819" y="69826"/>
             <a:ext cx="4941371" cy="6717054"/>
           </a:xfrm>
           <a:prstGeom prst="roundRect">
@@ -3402,8 +3407,8 @@
         </p:nvSpPr>
         <p:spPr>
           <a:xfrm>
-            <a:off x="45810" y="69826"/>
-            <a:ext cx="7132143" cy="6717054"/>
+            <a:off x="9284372" y="-3561"/>
+            <a:ext cx="2723717" cy="2011735"/>
           </a:xfrm>
           <a:prstGeom prst="roundRect">
             <a:avLst>
@@ -3469,7 +3474,7 @@
         </p:nvSpPr>
         <p:spPr>
           <a:xfrm>
-            <a:off x="2755584" y="2922953"/>
+            <a:off x="6057584" y="2922953"/>
             <a:ext cx="4362176" cy="3427276"/>
           </a:xfrm>
           <a:prstGeom prst="roundRect">
@@ -3508,7 +3513,7 @@
           <a:lstStyle/>
           <a:p>
             <a:pPr algn="ctr"/>
-            <a:endParaRPr lang="en-US"/>
+            <a:endParaRPr lang="en-US" sz="1200"/>
           </a:p>
         </p:txBody>
       </p:sp>
@@ -3526,7 +3531,7 @@
         </p:nvSpPr>
         <p:spPr>
           <a:xfrm>
-            <a:off x="2734751" y="2939662"/>
+            <a:off x="6036751" y="2939662"/>
             <a:ext cx="1304692" cy="530765"/>
           </a:xfrm>
           <a:prstGeom prst="rect">
@@ -3593,8 +3598,8 @@
         </p:nvSpPr>
         <p:spPr>
           <a:xfrm>
-            <a:off x="721789" y="494877"/>
-            <a:ext cx="1455629" cy="346760"/>
+            <a:off x="793418" y="494877"/>
+            <a:ext cx="1110404" cy="346760"/>
           </a:xfrm>
           <a:prstGeom prst="rect">
             <a:avLst/>
@@ -3629,7 +3634,7 @@
           <a:p>
             <a:pPr algn="ctr"/>
             <a:r>
-              <a:rPr lang="en-US" sz="1600" dirty="0">
+              <a:rPr lang="en-US" sz="1200" dirty="0">
                 <a:solidFill>
                   <a:schemeClr val="bg1"/>
                 </a:solidFill>
@@ -3637,14 +3642,14 @@
               <a:t>:</a:t>
             </a:r>
             <a:r>
-              <a:rPr lang="en-US" sz="1600" dirty="0" err="1">
+              <a:rPr lang="en-US" sz="1200" dirty="0" err="1">
                 <a:solidFill>
                   <a:schemeClr val="bg1"/>
                 </a:solidFill>
               </a:rPr>
               <a:t>LogicManager</a:t>
             </a:r>
-            <a:endParaRPr lang="en-SG" sz="1600" dirty="0">
+            <a:endParaRPr lang="en-SG" sz="1200" dirty="0">
               <a:solidFill>
                 <a:schemeClr val="bg1"/>
               </a:solidFill>
@@ -3668,7 +3673,7 @@
         </p:nvCxnSpPr>
         <p:spPr>
           <a:xfrm>
-            <a:off x="1449603" y="858548"/>
+            <a:off x="1345971" y="858548"/>
             <a:ext cx="0" cy="3481399"/>
           </a:xfrm>
           <a:prstGeom prst="line">
@@ -3711,8 +3716,8 @@
         </p:nvSpPr>
         <p:spPr>
           <a:xfrm>
-            <a:off x="1371564" y="1209241"/>
-            <a:ext cx="158431" cy="5525877"/>
+            <a:off x="1267932" y="1209241"/>
+            <a:ext cx="147255" cy="5525877"/>
           </a:xfrm>
           <a:prstGeom prst="rect">
             <a:avLst/>
@@ -3746,7 +3751,7 @@
           <a:lstStyle/>
           <a:p>
             <a:pPr algn="ctr"/>
-            <a:endParaRPr lang="en-SG" sz="1400"/>
+            <a:endParaRPr lang="en-SG" sz="1200"/>
           </a:p>
         </p:txBody>
       </p:sp>
@@ -3764,8 +3769,8 @@
         </p:nvSpPr>
         <p:spPr>
           <a:xfrm>
-            <a:off x="2298004" y="374140"/>
-            <a:ext cx="1492974" cy="467684"/>
+            <a:off x="2159180" y="374965"/>
+            <a:ext cx="1056227" cy="467684"/>
           </a:xfrm>
           <a:prstGeom prst="rect">
             <a:avLst/>
@@ -3800,7 +3805,7 @@
           <a:p>
             <a:pPr algn="ctr"/>
             <a:r>
-              <a:rPr lang="en-US" sz="1600" dirty="0">
+              <a:rPr lang="en-US" sz="1200" dirty="0">
                 <a:solidFill>
                   <a:schemeClr val="bg1"/>
                 </a:solidFill>
@@ -3811,14 +3816,14 @@
           <a:p>
             <a:pPr algn="ctr"/>
             <a:r>
-              <a:rPr lang="en-US" sz="1600" dirty="0" err="1">
+              <a:rPr lang="en-US" sz="1200" dirty="0" err="1">
                 <a:solidFill>
                   <a:schemeClr val="bg1"/>
                 </a:solidFill>
               </a:rPr>
               <a:t>PlannerParser</a:t>
             </a:r>
-            <a:endParaRPr lang="en-SG" sz="1600" dirty="0">
+            <a:endParaRPr lang="en-SG" sz="1200" dirty="0">
               <a:solidFill>
                 <a:schemeClr val="bg1"/>
               </a:solidFill>
@@ -3841,9 +3846,9 @@
           <p:nvPr/>
         </p:nvCxnSpPr>
         <p:spPr>
-          <a:xfrm>
-            <a:off x="3044491" y="858548"/>
-            <a:ext cx="0" cy="1482984"/>
+          <a:xfrm flipH="1">
+            <a:off x="2683928" y="858548"/>
+            <a:ext cx="899" cy="1348292"/>
           </a:xfrm>
           <a:prstGeom prst="line">
             <a:avLst/>
@@ -3885,8 +3890,8 @@
         </p:nvSpPr>
         <p:spPr>
           <a:xfrm>
-            <a:off x="2972484" y="1316741"/>
-            <a:ext cx="154408" cy="767790"/>
+            <a:off x="2608410" y="1305081"/>
+            <a:ext cx="152722" cy="750608"/>
           </a:xfrm>
           <a:prstGeom prst="rect">
             <a:avLst/>
@@ -3920,7 +3925,7 @@
           <a:lstStyle/>
           <a:p>
             <a:pPr algn="ctr"/>
-            <a:endParaRPr lang="en-SG" sz="1400">
+            <a:endParaRPr lang="en-SG" sz="1200">
               <a:solidFill>
                 <a:schemeClr val="dk1"/>
               </a:solidFill>
@@ -3942,7 +3947,7 @@
         </p:nvCxnSpPr>
         <p:spPr>
           <a:xfrm>
-            <a:off x="257744" y="1212930"/>
+            <a:off x="99248" y="1212930"/>
             <a:ext cx="1119851" cy="0"/>
           </a:xfrm>
           <a:prstGeom prst="straightConnector1">
@@ -3984,8 +3989,8 @@
         </p:nvSpPr>
         <p:spPr>
           <a:xfrm>
-            <a:off x="-11496" y="992331"/>
-            <a:ext cx="1424846" cy="430887"/>
+            <a:off x="-11496" y="1028907"/>
+            <a:ext cx="1110407" cy="369332"/>
           </a:xfrm>
           <a:prstGeom prst="rect">
             <a:avLst/>
@@ -4000,7 +4005,7 @@
           <a:p>
             <a:pPr algn="ctr"/>
             <a:r>
-              <a:rPr lang="en-US" sz="1400" dirty="0">
+              <a:rPr lang="en-US" sz="1200" dirty="0">
                 <a:solidFill>
                   <a:srgbClr val="0070C0"/>
                 </a:solidFill>
@@ -4011,28 +4016,12 @@
           <a:p>
             <a:pPr algn="ctr"/>
             <a:r>
-              <a:rPr lang="en-US" sz="1400" dirty="0">
+              <a:rPr lang="en-US" sz="1200" dirty="0">
                 <a:solidFill>
                   <a:srgbClr val="0070C0"/>
                 </a:solidFill>
               </a:rPr>
-              <a:t>(“</a:t>
-            </a:r>
-            <a:r>
-              <a:rPr lang="en-US" sz="1400" dirty="0" err="1">
-                <a:solidFill>
-                  <a:srgbClr val="0070C0"/>
-                </a:solidFill>
-              </a:rPr>
-              <a:t>delete_date</a:t>
-            </a:r>
-            <a:r>
-              <a:rPr lang="en-US" sz="1400" dirty="0">
-                <a:solidFill>
-                  <a:srgbClr val="0070C0"/>
-                </a:solidFill>
-              </a:rPr>
-              <a:t>”)</a:t>
+              <a:t>(“delete_date”)</a:t>
             </a:r>
           </a:p>
         </p:txBody>
@@ -4051,8 +4040,8 @@
         </p:nvSpPr>
         <p:spPr>
           <a:xfrm>
-            <a:off x="1971107" y="2069242"/>
-            <a:ext cx="855809" cy="215444"/>
+            <a:off x="2294332" y="2114507"/>
+            <a:ext cx="855809" cy="184666"/>
           </a:xfrm>
           <a:prstGeom prst="rect">
             <a:avLst/>
@@ -4076,8 +4065,9 @@
             </a:lvl1pPr>
           </a:lstStyle>
           <a:p>
-            <a:r>
-              <a:rPr lang="en-US" dirty="0"/>
+            <a:pPr algn="ctr"/>
+            <a:r>
+              <a:rPr lang="en-US" sz="1200" dirty="0"/>
               <a:t>execute()</a:t>
             </a:r>
           </a:p>
@@ -4098,9 +4088,9 @@
           <p:nvPr/>
         </p:nvCxnSpPr>
         <p:spPr>
-          <a:xfrm>
-            <a:off x="1529995" y="2043891"/>
-            <a:ext cx="1433520" cy="0"/>
+          <a:xfrm flipV="1">
+            <a:off x="1426363" y="2051117"/>
+            <a:ext cx="1176629" cy="394"/>
           </a:xfrm>
           <a:prstGeom prst="straightConnector1">
             <a:avLst/>
@@ -4143,8 +4133,8 @@
         </p:nvSpPr>
         <p:spPr>
           <a:xfrm>
-            <a:off x="4512001" y="2214643"/>
-            <a:ext cx="1880833" cy="215444"/>
+            <a:off x="7814001" y="2214643"/>
+            <a:ext cx="1880833" cy="184666"/>
           </a:xfrm>
           <a:prstGeom prst="rect">
             <a:avLst/>
@@ -4170,14 +4160,14 @@
           <a:p>
             <a:pPr algn="ctr"/>
             <a:r>
-              <a:rPr lang="en-US" dirty="0" err="1">
+              <a:rPr lang="en-US" sz="1200" dirty="0" err="1">
                 <a:solidFill>
                   <a:srgbClr val="7030A0"/>
                 </a:solidFill>
               </a:rPr>
               <a:t>getFilteredRecordList</a:t>
             </a:r>
-            <a:endParaRPr lang="en-US" dirty="0">
+            <a:endParaRPr lang="en-US" sz="1200" dirty="0">
               <a:solidFill>
                 <a:srgbClr val="7030A0"/>
               </a:solidFill>
@@ -4199,8 +4189,8 @@
         </p:nvSpPr>
         <p:spPr>
           <a:xfrm>
-            <a:off x="1288399" y="1087561"/>
-            <a:ext cx="1899551" cy="430887"/>
+            <a:off x="1029319" y="1118041"/>
+            <a:ext cx="1899551" cy="369332"/>
           </a:xfrm>
           <a:prstGeom prst="rect">
             <a:avLst/>
@@ -4226,23 +4216,22 @@
           <a:p>
             <a:pPr algn="ctr"/>
             <a:r>
-              <a:rPr lang="en-US" dirty="0" err="1"/>
+              <a:rPr lang="en-US" sz="1200" dirty="0"/>
               <a:t>parseCommand</a:t>
             </a:r>
-            <a:endParaRPr lang="en-US" dirty="0"/>
           </a:p>
           <a:p>
             <a:pPr algn="ctr"/>
             <a:r>
-              <a:rPr lang="en-US" dirty="0"/>
+              <a:rPr lang="en-US" sz="1200" dirty="0"/>
               <a:t>(“</a:t>
             </a:r>
             <a:r>
-              <a:rPr lang="en-US" dirty="0" err="1"/>
+              <a:rPr lang="en-US" sz="1200" dirty="0" err="1"/>
               <a:t>delete_date</a:t>
             </a:r>
             <a:r>
-              <a:rPr lang="en-US" dirty="0"/>
+              <a:rPr lang="en-US" sz="1200" dirty="0"/>
               <a:t>”)</a:t>
             </a:r>
           </a:p>
@@ -4262,7 +4251,7 @@
         </p:nvSpPr>
         <p:spPr>
           <a:xfrm>
-            <a:off x="8221594" y="2008174"/>
+            <a:off x="11523594" y="2008174"/>
             <a:ext cx="2181777" cy="335427"/>
           </a:xfrm>
           <a:prstGeom prst="rect">
@@ -4298,14 +4287,14 @@
           <a:p>
             <a:pPr algn="ctr"/>
             <a:r>
-              <a:rPr lang="en-US" sz="1600" dirty="0">
+              <a:rPr lang="en-US" sz="1200" dirty="0">
                 <a:solidFill>
                   <a:schemeClr val="bg1"/>
                 </a:solidFill>
               </a:rPr>
               <a:t>f:FilteredList&lt;Record&gt;</a:t>
             </a:r>
-            <a:endParaRPr lang="en-SG" sz="1600" dirty="0">
+            <a:endParaRPr lang="en-SG" sz="1200" dirty="0">
               <a:solidFill>
                 <a:schemeClr val="bg1"/>
               </a:solidFill>
@@ -4327,7 +4316,7 @@
         </p:nvSpPr>
         <p:spPr>
           <a:xfrm>
-            <a:off x="9848246" y="2622408"/>
+            <a:off x="13150246" y="2622408"/>
             <a:ext cx="213964" cy="398562"/>
           </a:xfrm>
           <a:prstGeom prst="rect">
@@ -4362,7 +4351,7 @@
           <a:lstStyle/>
           <a:p>
             <a:pPr algn="ctr"/>
-            <a:endParaRPr lang="en-SG" sz="1400"/>
+            <a:endParaRPr lang="en-SG" sz="1200"/>
           </a:p>
         </p:txBody>
       </p:sp>
@@ -4380,7 +4369,7 @@
         </p:nvSpPr>
         <p:spPr>
           <a:xfrm>
-            <a:off x="7274203" y="1665719"/>
+            <a:off x="10576203" y="1665719"/>
             <a:ext cx="872849" cy="436229"/>
           </a:xfrm>
           <a:prstGeom prst="rect">
@@ -4416,7 +4405,7 @@
           <a:p>
             <a:pPr algn="ctr"/>
             <a:r>
-              <a:rPr lang="en-US" sz="1600" dirty="0">
+              <a:rPr lang="en-US" sz="1200" dirty="0">
                 <a:solidFill>
                   <a:schemeClr val="bg1"/>
                 </a:solidFill>
@@ -4427,14 +4416,14 @@
           <a:p>
             <a:pPr algn="ctr"/>
             <a:r>
-              <a:rPr lang="en-US" sz="1600" dirty="0">
+              <a:rPr lang="en-US" sz="1200" dirty="0">
                 <a:solidFill>
                   <a:schemeClr val="bg1"/>
                 </a:solidFill>
               </a:rPr>
               <a:t>: Model</a:t>
             </a:r>
-            <a:endParaRPr lang="en-SG" sz="1600" dirty="0">
+            <a:endParaRPr lang="en-SG" sz="1200" dirty="0">
               <a:solidFill>
                 <a:schemeClr val="bg1"/>
               </a:solidFill>
@@ -4458,7 +4447,7 @@
         </p:nvCxnSpPr>
         <p:spPr>
           <a:xfrm>
-            <a:off x="7684410" y="2092874"/>
+            <a:off x="10986410" y="2092874"/>
             <a:ext cx="0" cy="4685421"/>
           </a:xfrm>
           <a:prstGeom prst="line">
@@ -4501,7 +4490,7 @@
         </p:nvSpPr>
         <p:spPr>
           <a:xfrm>
-            <a:off x="7598844" y="2423737"/>
+            <a:off x="10900844" y="2423737"/>
             <a:ext cx="179875" cy="384124"/>
           </a:xfrm>
           <a:prstGeom prst="rect">
@@ -4536,7 +4525,7 @@
           <a:lstStyle/>
           <a:p>
             <a:pPr algn="ctr"/>
-            <a:endParaRPr lang="en-SG" sz="1400"/>
+            <a:endParaRPr lang="en-SG" sz="1200"/>
           </a:p>
         </p:txBody>
       </p:sp>
@@ -4556,7 +4545,7 @@
         </p:nvCxnSpPr>
         <p:spPr>
           <a:xfrm>
-            <a:off x="4207268" y="2459833"/>
+            <a:off x="7509268" y="2459833"/>
             <a:ext cx="3404698" cy="0"/>
           </a:xfrm>
           <a:prstGeom prst="straightConnector1">
@@ -4598,7 +4587,7 @@
         </p:nvGrpSpPr>
         <p:grpSpPr>
           <a:xfrm>
-            <a:off x="3087667" y="1178308"/>
+            <a:off x="6389667" y="1178308"/>
             <a:ext cx="2088700" cy="5635040"/>
             <a:chOff x="3571868" y="2139600"/>
             <a:chExt cx="2088700" cy="5310809"/>
@@ -4699,7 +4688,7 @@
             <a:lstStyle/>
             <a:p>
               <a:pPr algn="ctr"/>
-              <a:endParaRPr lang="en-SG" sz="1400" dirty="0"/>
+              <a:endParaRPr lang="en-SG" sz="1200" dirty="0"/>
             </a:p>
           </p:txBody>
         </p:sp>
@@ -4808,7 +4797,7 @@
           <p:spPr>
             <a:xfrm>
               <a:off x="3830989" y="2659857"/>
-              <a:ext cx="220343" cy="215444"/>
+              <a:ext cx="220343" cy="174041"/>
             </a:xfrm>
             <a:prstGeom prst="rect">
               <a:avLst/>
@@ -4833,10 +4822,10 @@
             </a:lstStyle>
             <a:p>
               <a:r>
-                <a:rPr lang="en-US" dirty="0" err="1"/>
+                <a:rPr lang="en-US" sz="1200" dirty="0" err="1"/>
                 <a:t>dd</a:t>
               </a:r>
-              <a:endParaRPr lang="en-US" dirty="0"/>
+              <a:endParaRPr lang="en-US" sz="1200" dirty="0"/>
             </a:p>
           </p:txBody>
         </p:sp>
@@ -4890,7 +4879,7 @@
             <a:p>
               <a:pPr algn="ctr"/>
               <a:r>
-                <a:rPr lang="en-US" sz="1600" dirty="0" err="1">
+                <a:rPr lang="en-US" sz="1200" dirty="0" err="1">
                   <a:solidFill>
                     <a:schemeClr val="bg1"/>
                   </a:solidFill>
@@ -4898,21 +4887,21 @@
                 <a:t>dd:DeleteByDate</a:t>
               </a:r>
               <a:br>
-                <a:rPr lang="en-US" sz="1600" dirty="0">
+                <a:rPr lang="en-US" sz="1200" dirty="0">
                   <a:solidFill>
                     <a:schemeClr val="bg1"/>
                   </a:solidFill>
                 </a:rPr>
               </a:br>
               <a:r>
-                <a:rPr lang="en-US" sz="1600" dirty="0" err="1">
+                <a:rPr lang="en-US" sz="1200" dirty="0" err="1">
                   <a:solidFill>
                     <a:schemeClr val="bg1"/>
                   </a:solidFill>
                 </a:rPr>
                 <a:t>EntryCommand</a:t>
               </a:r>
-              <a:endParaRPr lang="en-SG" sz="1600" dirty="0">
+              <a:endParaRPr lang="en-SG" sz="1200" dirty="0">
                 <a:solidFill>
                   <a:schemeClr val="bg1"/>
                 </a:solidFill>
@@ -4937,7 +4926,7 @@
         </p:nvCxnSpPr>
         <p:spPr>
           <a:xfrm>
-            <a:off x="1529995" y="2316485"/>
+            <a:off x="1414171" y="2316485"/>
             <a:ext cx="2519527" cy="8583"/>
           </a:xfrm>
           <a:prstGeom prst="straightConnector1">
@@ -4981,8 +4970,8 @@
         </p:nvCxnSpPr>
         <p:spPr>
           <a:xfrm>
-            <a:off x="1546889" y="1314849"/>
-            <a:ext cx="1416626" cy="0"/>
+            <a:off x="1410290" y="1316741"/>
+            <a:ext cx="1192702" cy="0"/>
           </a:xfrm>
           <a:prstGeom prst="straightConnector1">
             <a:avLst/>
@@ -5088,7 +5077,7 @@
           <p:spPr>
             <a:xfrm>
               <a:off x="2410982" y="5402513"/>
-              <a:ext cx="621216" cy="215444"/>
+              <a:ext cx="621216" cy="184666"/>
             </a:xfrm>
             <a:prstGeom prst="rect">
               <a:avLst/>
@@ -5113,7 +5102,7 @@
             </a:lstStyle>
             <a:p>
               <a:r>
-                <a:rPr lang="en-US" dirty="0"/>
+                <a:rPr lang="en-US" sz="1200" dirty="0"/>
                 <a:t>result</a:t>
               </a:r>
             </a:p>
@@ -5134,7 +5123,7 @@
           <p:spPr>
             <a:xfrm>
               <a:off x="457265" y="5482749"/>
-              <a:ext cx="762000" cy="215444"/>
+              <a:ext cx="762000" cy="184666"/>
             </a:xfrm>
             <a:prstGeom prst="rect">
               <a:avLst/>
@@ -5159,7 +5148,7 @@
             </a:lstStyle>
             <a:p>
               <a:r>
-                <a:rPr lang="en-US" dirty="0"/>
+                <a:rPr lang="en-US" sz="1200" dirty="0"/>
                 <a:t>result</a:t>
               </a:r>
             </a:p>
@@ -5228,7 +5217,7 @@
         </p:nvCxnSpPr>
         <p:spPr>
           <a:xfrm>
-            <a:off x="9922082" y="2310923"/>
+            <a:off x="13224082" y="2310923"/>
             <a:ext cx="0" cy="883381"/>
           </a:xfrm>
           <a:prstGeom prst="line">
@@ -5271,7 +5260,7 @@
         </p:nvSpPr>
         <p:spPr>
           <a:xfrm>
-            <a:off x="10166364" y="2635151"/>
+            <a:off x="13580124" y="2635151"/>
             <a:ext cx="2829962" cy="369332"/>
           </a:xfrm>
           <a:prstGeom prst="rect">
@@ -5359,7 +5348,7 @@
         </p:nvCxnSpPr>
         <p:spPr>
           <a:xfrm>
-            <a:off x="7768430" y="2622407"/>
+            <a:off x="11070430" y="2622407"/>
             <a:ext cx="2079816" cy="0"/>
           </a:xfrm>
           <a:prstGeom prst="straightConnector1">
@@ -5403,7 +5392,7 @@
         </p:nvCxnSpPr>
         <p:spPr>
           <a:xfrm>
-            <a:off x="4206490" y="2806083"/>
+            <a:off x="7508490" y="2806083"/>
             <a:ext cx="3459444" cy="0"/>
           </a:xfrm>
           <a:prstGeom prst="straightConnector1">
@@ -5447,7 +5436,7 @@
         </p:nvCxnSpPr>
         <p:spPr>
           <a:xfrm flipV="1">
-            <a:off x="5040222" y="1574020"/>
+            <a:off x="8342222" y="1574020"/>
             <a:ext cx="922392" cy="1"/>
           </a:xfrm>
           <a:prstGeom prst="straightConnector1">
@@ -5489,7 +5478,7 @@
         </p:nvSpPr>
         <p:spPr>
           <a:xfrm>
-            <a:off x="5969660" y="1287679"/>
+            <a:off x="9271660" y="1287679"/>
             <a:ext cx="1156726" cy="461538"/>
           </a:xfrm>
           <a:prstGeom prst="rect">
@@ -5525,14 +5514,14 @@
           <a:p>
             <a:pPr algn="ctr"/>
             <a:r>
-              <a:rPr lang="en-US" sz="1600" dirty="0" err="1">
+              <a:rPr lang="en-US" sz="1200" dirty="0" err="1">
                 <a:solidFill>
                   <a:schemeClr val="bg1"/>
                 </a:solidFill>
               </a:rPr>
               <a:t>target_date:Date</a:t>
             </a:r>
-            <a:endParaRPr lang="en-SG" sz="1600" dirty="0">
+            <a:endParaRPr lang="en-SG" sz="1200" dirty="0">
               <a:solidFill>
                 <a:schemeClr val="bg1"/>
               </a:solidFill>
@@ -5554,7 +5543,7 @@
         </p:nvSpPr>
         <p:spPr>
           <a:xfrm>
-            <a:off x="6464978" y="1747035"/>
+            <a:off x="9766978" y="1747035"/>
             <a:ext cx="152400" cy="138000"/>
           </a:xfrm>
           <a:prstGeom prst="rect">
@@ -5589,7 +5578,7 @@
           <a:lstStyle/>
           <a:p>
             <a:pPr algn="ctr"/>
-            <a:endParaRPr lang="en-SG" sz="1400" dirty="0"/>
+            <a:endParaRPr lang="en-SG" sz="1200" dirty="0"/>
           </a:p>
         </p:txBody>
       </p:sp>
@@ -5609,7 +5598,7 @@
         </p:nvCxnSpPr>
         <p:spPr>
           <a:xfrm>
-            <a:off x="4236970" y="1885035"/>
+            <a:off x="7538970" y="1885035"/>
             <a:ext cx="2260128" cy="0"/>
           </a:xfrm>
           <a:prstGeom prst="straightConnector1">
@@ -5653,8 +5642,8 @@
         </p:nvSpPr>
         <p:spPr>
           <a:xfrm>
-            <a:off x="4985165" y="1652177"/>
-            <a:ext cx="922392" cy="215444"/>
+            <a:off x="8287165" y="1652177"/>
+            <a:ext cx="922392" cy="184666"/>
           </a:xfrm>
           <a:prstGeom prst="rect">
             <a:avLst/>
@@ -5679,10 +5668,10 @@
           </a:lstStyle>
           <a:p>
             <a:r>
-              <a:rPr lang="en-US" dirty="0" err="1"/>
+              <a:rPr lang="en-US" sz="1200" dirty="0" err="1"/>
               <a:t>target_date</a:t>
             </a:r>
-            <a:endParaRPr lang="en-US" dirty="0"/>
+            <a:endParaRPr lang="en-US" sz="1200" dirty="0"/>
           </a:p>
         </p:txBody>
       </p:sp>
@@ -5700,8 +5689,8 @@
         </p:nvSpPr>
         <p:spPr>
           <a:xfrm>
-            <a:off x="2128130" y="1816035"/>
-            <a:ext cx="220343" cy="215444"/>
+            <a:off x="2038009" y="1816142"/>
+            <a:ext cx="220343" cy="184666"/>
           </a:xfrm>
           <a:prstGeom prst="rect">
             <a:avLst/>
@@ -5727,7 +5716,7 @@
           <a:p>
             <a:pPr algn="ctr"/>
             <a:r>
-              <a:rPr lang="en-US" dirty="0"/>
+              <a:rPr lang="en-US" sz="1200" dirty="0"/>
               <a:t>c</a:t>
             </a:r>
           </a:p>
@@ -5749,7 +5738,7 @@
         </p:nvCxnSpPr>
         <p:spPr>
           <a:xfrm rot="5400000">
-            <a:off x="9814632" y="2789206"/>
+            <a:off x="13116632" y="2789206"/>
             <a:ext cx="398563" cy="64966"/>
           </a:xfrm>
           <a:prstGeom prst="curvedConnector5">
@@ -5792,8 +5781,8 @@
         </p:nvSpPr>
         <p:spPr>
           <a:xfrm>
-            <a:off x="5715674" y="2583020"/>
-            <a:ext cx="220343" cy="215444"/>
+            <a:off x="9017674" y="2583020"/>
+            <a:ext cx="220343" cy="184666"/>
           </a:xfrm>
           <a:prstGeom prst="rect">
             <a:avLst/>
@@ -5819,7 +5808,7 @@
           <a:p>
             <a:pPr algn="ctr"/>
             <a:r>
-              <a:rPr lang="en-US" dirty="0">
+              <a:rPr lang="en-US" sz="1200" dirty="0">
                 <a:solidFill>
                   <a:srgbClr val="7030A0"/>
                 </a:solidFill>
@@ -5845,7 +5834,7 @@
         </p:nvCxnSpPr>
         <p:spPr>
           <a:xfrm>
-            <a:off x="6548437" y="1850613"/>
+            <a:off x="9850437" y="1850613"/>
             <a:ext cx="14466" cy="4884505"/>
           </a:xfrm>
           <a:prstGeom prst="line">
@@ -5888,8 +5877,8 @@
         </p:nvSpPr>
         <p:spPr>
           <a:xfrm>
-            <a:off x="7611958" y="4397843"/>
-            <a:ext cx="974478" cy="215444"/>
+            <a:off x="10913958" y="4397843"/>
+            <a:ext cx="974478" cy="184666"/>
           </a:xfrm>
           <a:prstGeom prst="rect">
             <a:avLst/>
@@ -5915,14 +5904,14 @@
           <a:p>
             <a:pPr algn="ctr"/>
             <a:r>
-              <a:rPr lang="en-US" dirty="0" err="1">
+              <a:rPr lang="en-US" sz="1200" dirty="0" err="1">
                 <a:solidFill>
                   <a:srgbClr val="7030A0"/>
                 </a:solidFill>
               </a:rPr>
               <a:t>rdate:Date</a:t>
             </a:r>
-            <a:endParaRPr lang="en-US" dirty="0">
+            <a:endParaRPr lang="en-US" sz="1200" dirty="0">
               <a:solidFill>
                 <a:srgbClr val="7030A0"/>
               </a:solidFill>
@@ -5944,7 +5933,7 @@
         </p:nvGrpSpPr>
         <p:grpSpPr>
           <a:xfrm>
-            <a:off x="4183317" y="3245231"/>
+            <a:off x="7485317" y="3245231"/>
             <a:ext cx="6873364" cy="1352021"/>
             <a:chOff x="4203594" y="3661939"/>
             <a:chExt cx="6873364" cy="1352021"/>
@@ -6000,14 +5989,14 @@
             <a:p>
               <a:pPr algn="ctr"/>
               <a:r>
-                <a:rPr lang="en-US" sz="1450" dirty="0">
+                <a:rPr lang="en-US" sz="1200" dirty="0">
                   <a:solidFill>
                     <a:schemeClr val="bg1"/>
                   </a:solidFill>
                 </a:rPr>
                 <a:t>r:Record</a:t>
               </a:r>
-              <a:endParaRPr lang="en-SG" sz="1450" dirty="0">
+              <a:endParaRPr lang="en-SG" sz="1200" dirty="0">
                 <a:solidFill>
                   <a:schemeClr val="bg1"/>
                 </a:solidFill>
@@ -6109,7 +6098,7 @@
             <a:lstStyle/>
             <a:p>
               <a:pPr algn="ctr"/>
-              <a:endParaRPr lang="en-SG" sz="1400"/>
+              <a:endParaRPr lang="en-SG" sz="1200"/>
             </a:p>
           </p:txBody>
         </p:sp>
@@ -6172,7 +6161,7 @@
           <p:spPr>
             <a:xfrm>
               <a:off x="4883246" y="3958458"/>
-              <a:ext cx="1880833" cy="215444"/>
+              <a:ext cx="1880833" cy="184666"/>
             </a:xfrm>
             <a:prstGeom prst="rect">
               <a:avLst/>
@@ -6198,7 +6187,7 @@
             <a:p>
               <a:pPr algn="ctr"/>
               <a:r>
-                <a:rPr lang="en-US" dirty="0">
+                <a:rPr lang="en-US" sz="1200" dirty="0">
                   <a:solidFill>
                     <a:srgbClr val="7030A0"/>
                   </a:solidFill>
@@ -6257,7 +6246,7 @@
             <a:lstStyle/>
             <a:p>
               <a:pPr algn="ctr"/>
-              <a:endParaRPr lang="en-SG" sz="1400" dirty="0"/>
+              <a:endParaRPr lang="en-SG" sz="1200" dirty="0"/>
             </a:p>
           </p:txBody>
         </p:sp>
@@ -6320,7 +6309,7 @@
           <p:spPr>
             <a:xfrm>
               <a:off x="7299973" y="4153618"/>
-              <a:ext cx="1880833" cy="215444"/>
+              <a:ext cx="1880833" cy="184666"/>
             </a:xfrm>
             <a:prstGeom prst="rect">
               <a:avLst/>
@@ -6346,7 +6335,7 @@
             <a:p>
               <a:pPr algn="ctr"/>
               <a:r>
-                <a:rPr lang="en-US" dirty="0" err="1">
+                <a:rPr lang="en-US" sz="1200" dirty="0" err="1">
                   <a:solidFill>
                     <a:srgbClr val="7030A0"/>
                   </a:solidFill>
@@ -6354,7 +6343,7 @@
                 <a:t>getDate</a:t>
               </a:r>
               <a:r>
-                <a:rPr lang="en-US" dirty="0">
+                <a:rPr lang="en-US" sz="1200" dirty="0">
                   <a:solidFill>
                     <a:srgbClr val="7030A0"/>
                   </a:solidFill>
@@ -6471,7 +6460,7 @@
           <p:spPr>
             <a:xfrm>
               <a:off x="5448672" y="4570319"/>
-              <a:ext cx="891330" cy="215444"/>
+              <a:ext cx="891330" cy="184666"/>
             </a:xfrm>
             <a:prstGeom prst="rect">
               <a:avLst/>
@@ -6497,14 +6486,14 @@
             <a:p>
               <a:pPr algn="ctr"/>
               <a:r>
-                <a:rPr lang="en-US" dirty="0" err="1">
+                <a:rPr lang="en-US" sz="1200" dirty="0" err="1">
                   <a:solidFill>
                     <a:srgbClr val="7030A0"/>
                   </a:solidFill>
                 </a:rPr>
                 <a:t>rdate:Date</a:t>
               </a:r>
-              <a:endParaRPr lang="en-US" dirty="0">
+              <a:endParaRPr lang="en-US" sz="1200" dirty="0">
                 <a:solidFill>
                   <a:srgbClr val="7030A0"/>
                 </a:solidFill>
@@ -6527,7 +6516,7 @@
         </p:nvGrpSpPr>
         <p:grpSpPr>
           <a:xfrm>
-            <a:off x="2851602" y="4724128"/>
+            <a:off x="6153602" y="4724128"/>
             <a:ext cx="11150012" cy="1707088"/>
             <a:chOff x="2690448" y="4948518"/>
             <a:chExt cx="11150012" cy="1707088"/>
@@ -6583,7 +6572,7 @@
             <a:lstStyle/>
             <a:p>
               <a:pPr algn="ctr"/>
-              <a:endParaRPr lang="en-US" dirty="0"/>
+              <a:endParaRPr lang="en-US" sz="1200" dirty="0"/>
             </a:p>
           </p:txBody>
         </p:sp>
@@ -6733,7 +6722,7 @@
           <p:spPr>
             <a:xfrm>
               <a:off x="4488195" y="5460351"/>
-              <a:ext cx="1880833" cy="215444"/>
+              <a:ext cx="1880833" cy="184666"/>
             </a:xfrm>
             <a:prstGeom prst="rect">
               <a:avLst/>
@@ -6759,7 +6748,7 @@
             <a:p>
               <a:pPr algn="ctr"/>
               <a:r>
-                <a:rPr lang="en-US" dirty="0" err="1">
+                <a:rPr lang="en-US" sz="1200" dirty="0" err="1">
                   <a:solidFill>
                     <a:srgbClr val="7030A0"/>
                   </a:solidFill>
@@ -6767,7 +6756,7 @@
                 <a:t>deleteRecord</a:t>
               </a:r>
               <a:r>
-                <a:rPr lang="en-US" dirty="0">
+                <a:rPr lang="en-US" sz="1200" dirty="0">
                   <a:solidFill>
                     <a:srgbClr val="7030A0"/>
                   </a:solidFill>
@@ -6870,7 +6859,7 @@
             <a:lstStyle/>
             <a:p>
               <a:pPr algn="ctr"/>
-              <a:endParaRPr lang="en-SG" sz="1400" dirty="0"/>
+              <a:endParaRPr lang="en-SG" sz="1200" dirty="0"/>
             </a:p>
           </p:txBody>
         </p:sp>
@@ -6924,7 +6913,7 @@
             <a:p>
               <a:pPr algn="ctr"/>
               <a:r>
-                <a:rPr lang="en-US" sz="1600" dirty="0">
+                <a:rPr lang="en-US" sz="1200" dirty="0">
                   <a:solidFill>
                     <a:schemeClr val="bg1"/>
                   </a:solidFill>
@@ -6932,14 +6921,14 @@
                 <a:t>:</a:t>
               </a:r>
               <a:r>
-                <a:rPr lang="en-US" sz="1600" dirty="0" err="1">
+                <a:rPr lang="en-US" sz="1200" dirty="0" err="1">
                   <a:solidFill>
                     <a:schemeClr val="bg1"/>
                   </a:solidFill>
                 </a:rPr>
                 <a:t>VersionedFinancialPlanner</a:t>
               </a:r>
-              <a:endParaRPr lang="en-SG" sz="1600" dirty="0">
+              <a:endParaRPr lang="en-SG" sz="1200" dirty="0">
                 <a:solidFill>
                   <a:schemeClr val="bg1"/>
                 </a:solidFill>
@@ -7247,7 +7236,7 @@
             <a:lstStyle/>
             <a:p>
               <a:pPr algn="ctr"/>
-              <a:endParaRPr lang="en-SG" sz="1400" dirty="0"/>
+              <a:endParaRPr lang="en-SG" sz="1200" dirty="0"/>
             </a:p>
           </p:txBody>
         </p:sp>
@@ -7312,7 +7301,7 @@
         </p:nvSpPr>
         <p:spPr>
           <a:xfrm>
-            <a:off x="4053041" y="2284686"/>
+            <a:off x="7355041" y="2284686"/>
             <a:ext cx="146452" cy="4322002"/>
           </a:xfrm>
           <a:prstGeom prst="rect">
@@ -7347,7 +7336,7 @@
           <a:lstStyle/>
           <a:p>
             <a:pPr algn="ctr"/>
-            <a:endParaRPr lang="en-SG" sz="1400" dirty="0"/>
+            <a:endParaRPr lang="en-SG" sz="1200" dirty="0"/>
           </a:p>
         </p:txBody>
       </p:sp>
@@ -7367,7 +7356,7 @@
         </p:nvCxnSpPr>
         <p:spPr>
           <a:xfrm>
-            <a:off x="6549110" y="1850613"/>
+            <a:off x="9851110" y="1850613"/>
             <a:ext cx="14466" cy="4884505"/>
           </a:xfrm>
           <a:prstGeom prst="line">
@@ -7396,6 +7385,754 @@
           </a:fontRef>
         </p:style>
       </p:cxnSp>
+      <p:cxnSp>
+        <p:nvCxnSpPr>
+          <p:cNvPr id="83" name="Straight Arrow Connector 82">
+            <a:extLst>
+              <a:ext uri="{FF2B5EF4-FFF2-40B4-BE49-F238E27FC236}">
+                <a16:creationId xmlns:a16="http://schemas.microsoft.com/office/drawing/2014/main" id="{B5853A31-45D9-4411-826F-AAF9E00BCD88}"/>
+              </a:ext>
+            </a:extLst>
+          </p:cNvPr>
+          <p:cNvCxnSpPr>
+            <a:cxnSpLocks/>
+          </p:cNvCxnSpPr>
+          <p:nvPr/>
+        </p:nvCxnSpPr>
+        <p:spPr>
+          <a:xfrm>
+            <a:off x="2766040" y="1374527"/>
+            <a:ext cx="1254128" cy="0"/>
+          </a:xfrm>
+          <a:prstGeom prst="straightConnector1">
+            <a:avLst/>
+          </a:prstGeom>
+          <a:ln w="19050">
+            <a:solidFill>
+              <a:srgbClr val="0070C0"/>
+            </a:solidFill>
+            <a:tailEnd type="arrow"/>
+          </a:ln>
+        </p:spPr>
+        <p:style>
+          <a:lnRef idx="1">
+            <a:schemeClr val="accent1"/>
+          </a:lnRef>
+          <a:fillRef idx="0">
+            <a:schemeClr val="accent1"/>
+          </a:fillRef>
+          <a:effectRef idx="0">
+            <a:schemeClr val="accent1"/>
+          </a:effectRef>
+          <a:fontRef idx="minor">
+            <a:schemeClr val="tx1"/>
+          </a:fontRef>
+        </p:style>
+      </p:cxnSp>
+      <p:sp>
+        <p:nvSpPr>
+          <p:cNvPr id="84" name="Rectangle 62">
+            <a:extLst>
+              <a:ext uri="{FF2B5EF4-FFF2-40B4-BE49-F238E27FC236}">
+                <a16:creationId xmlns:a16="http://schemas.microsoft.com/office/drawing/2014/main" id="{870E66F5-9D8B-4C19-8C39-29DA81D21172}"/>
+              </a:ext>
+            </a:extLst>
+          </p:cNvPr>
+          <p:cNvSpPr/>
+          <p:nvPr/>
+        </p:nvSpPr>
+        <p:spPr>
+          <a:xfrm>
+            <a:off x="3470765" y="351922"/>
+            <a:ext cx="1274405" cy="489715"/>
+          </a:xfrm>
+          <a:prstGeom prst="rect">
+            <a:avLst/>
+          </a:prstGeom>
+          <a:solidFill>
+            <a:srgbClr val="0070C0"/>
+          </a:solidFill>
+          <a:ln w="19050">
+            <a:solidFill>
+              <a:srgbClr val="0070C0"/>
+            </a:solidFill>
+          </a:ln>
+          <a:effectLst/>
+        </p:spPr>
+        <p:style>
+          <a:lnRef idx="1">
+            <a:schemeClr val="accent2"/>
+          </a:lnRef>
+          <a:fillRef idx="2">
+            <a:schemeClr val="accent2"/>
+          </a:fillRef>
+          <a:effectRef idx="1">
+            <a:schemeClr val="accent2"/>
+          </a:effectRef>
+          <a:fontRef idx="minor">
+            <a:schemeClr val="dk1"/>
+          </a:fontRef>
+        </p:style>
+        <p:txBody>
+          <a:bodyPr rtlCol="0" anchor="ctr"/>
+          <a:lstStyle/>
+          <a:p>
+            <a:pPr algn="ctr"/>
+            <a:r>
+              <a:rPr lang="en-US" sz="1200" dirty="0">
+                <a:solidFill>
+                  <a:schemeClr val="bg1"/>
+                </a:solidFill>
+              </a:rPr>
+              <a:t>:</a:t>
+            </a:r>
+            <a:r>
+              <a:rPr lang="en-US" sz="1200" dirty="0" err="1">
+                <a:solidFill>
+                  <a:schemeClr val="bg1"/>
+                </a:solidFill>
+              </a:rPr>
+              <a:t>DeleteByDate</a:t>
+            </a:r>
+            <a:br>
+              <a:rPr lang="en-US" sz="1200" dirty="0">
+                <a:solidFill>
+                  <a:schemeClr val="bg1"/>
+                </a:solidFill>
+              </a:rPr>
+            </a:br>
+            <a:r>
+              <a:rPr lang="en-US" sz="1200" dirty="0" err="1">
+                <a:solidFill>
+                  <a:schemeClr val="bg1"/>
+                </a:solidFill>
+              </a:rPr>
+              <a:t>EntryParser</a:t>
+            </a:r>
+            <a:endParaRPr lang="en-SG" sz="1200" dirty="0">
+              <a:solidFill>
+                <a:schemeClr val="bg1"/>
+              </a:solidFill>
+            </a:endParaRPr>
+          </a:p>
+        </p:txBody>
+      </p:sp>
+      <p:cxnSp>
+        <p:nvCxnSpPr>
+          <p:cNvPr id="88" name="Straight Connector 87">
+            <a:extLst>
+              <a:ext uri="{FF2B5EF4-FFF2-40B4-BE49-F238E27FC236}">
+                <a16:creationId xmlns:a16="http://schemas.microsoft.com/office/drawing/2014/main" id="{9C79F91D-4024-48C2-BAA3-B63F803C8A28}"/>
+              </a:ext>
+            </a:extLst>
+          </p:cNvPr>
+          <p:cNvCxnSpPr>
+            <a:cxnSpLocks/>
+          </p:cNvCxnSpPr>
+          <p:nvPr/>
+        </p:nvCxnSpPr>
+        <p:spPr>
+          <a:xfrm flipH="1">
+            <a:off x="4098601" y="858548"/>
+            <a:ext cx="899" cy="1348292"/>
+          </a:xfrm>
+          <a:prstGeom prst="line">
+            <a:avLst/>
+          </a:prstGeom>
+          <a:ln w="19050">
+            <a:solidFill>
+              <a:srgbClr val="0070C0"/>
+            </a:solidFill>
+            <a:prstDash val="sysDash"/>
+          </a:ln>
+          <a:effectLst/>
+        </p:spPr>
+        <p:style>
+          <a:lnRef idx="1">
+            <a:schemeClr val="accent1"/>
+          </a:lnRef>
+          <a:fillRef idx="2">
+            <a:schemeClr val="accent1"/>
+          </a:fillRef>
+          <a:effectRef idx="1">
+            <a:schemeClr val="accent1"/>
+          </a:effectRef>
+          <a:fontRef idx="minor">
+            <a:schemeClr val="dk1"/>
+          </a:fontRef>
+        </p:style>
+      </p:cxnSp>
+      <p:sp>
+        <p:nvSpPr>
+          <p:cNvPr id="90" name="Rectangle 89">
+            <a:extLst>
+              <a:ext uri="{FF2B5EF4-FFF2-40B4-BE49-F238E27FC236}">
+                <a16:creationId xmlns:a16="http://schemas.microsoft.com/office/drawing/2014/main" id="{E65B2A45-4330-417E-BC22-024815F0E6DB}"/>
+              </a:ext>
+            </a:extLst>
+          </p:cNvPr>
+          <p:cNvSpPr/>
+          <p:nvPr/>
+        </p:nvSpPr>
+        <p:spPr>
+          <a:xfrm>
+            <a:off x="4020168" y="1376866"/>
+            <a:ext cx="161392" cy="189980"/>
+          </a:xfrm>
+          <a:prstGeom prst="rect">
+            <a:avLst/>
+          </a:prstGeom>
+          <a:solidFill>
+            <a:srgbClr val="0070C0"/>
+          </a:solidFill>
+          <a:ln>
+            <a:solidFill>
+              <a:srgbClr val="0070C0"/>
+            </a:solidFill>
+          </a:ln>
+          <a:effectLst/>
+        </p:spPr>
+        <p:style>
+          <a:lnRef idx="1">
+            <a:schemeClr val="accent3"/>
+          </a:lnRef>
+          <a:fillRef idx="2">
+            <a:schemeClr val="accent3"/>
+          </a:fillRef>
+          <a:effectRef idx="1">
+            <a:schemeClr val="accent3"/>
+          </a:effectRef>
+          <a:fontRef idx="minor">
+            <a:schemeClr val="dk1"/>
+          </a:fontRef>
+        </p:style>
+        <p:txBody>
+          <a:bodyPr rtlCol="0" anchor="ctr"/>
+          <a:lstStyle/>
+          <a:p>
+            <a:pPr algn="ctr"/>
+            <a:endParaRPr lang="en-SG" sz="1200">
+              <a:solidFill>
+                <a:schemeClr val="dk1"/>
+              </a:solidFill>
+            </a:endParaRPr>
+          </a:p>
+        </p:txBody>
+      </p:sp>
+      <p:cxnSp>
+        <p:nvCxnSpPr>
+          <p:cNvPr id="94" name="Straight Arrow Connector 93">
+            <a:extLst>
+              <a:ext uri="{FF2B5EF4-FFF2-40B4-BE49-F238E27FC236}">
+                <a16:creationId xmlns:a16="http://schemas.microsoft.com/office/drawing/2014/main" id="{4EB33917-6236-4711-A825-AB37D266ACBC}"/>
+              </a:ext>
+            </a:extLst>
+          </p:cNvPr>
+          <p:cNvCxnSpPr>
+            <a:cxnSpLocks/>
+          </p:cNvCxnSpPr>
+          <p:nvPr/>
+        </p:nvCxnSpPr>
+        <p:spPr>
+          <a:xfrm flipV="1">
+            <a:off x="2760258" y="1561568"/>
+            <a:ext cx="1297103" cy="394"/>
+          </a:xfrm>
+          <a:prstGeom prst="straightConnector1">
+            <a:avLst/>
+          </a:prstGeom>
+          <a:ln w="19050">
+            <a:solidFill>
+              <a:srgbClr val="0070C0"/>
+            </a:solidFill>
+            <a:prstDash val="sysDash"/>
+            <a:headEnd type="arrow" w="med" len="med"/>
+            <a:tailEnd type="none" w="med" len="med"/>
+          </a:ln>
+        </p:spPr>
+        <p:style>
+          <a:lnRef idx="1">
+            <a:schemeClr val="accent1"/>
+          </a:lnRef>
+          <a:fillRef idx="0">
+            <a:schemeClr val="accent1"/>
+          </a:fillRef>
+          <a:effectRef idx="0">
+            <a:schemeClr val="accent1"/>
+          </a:effectRef>
+          <a:fontRef idx="minor">
+            <a:schemeClr val="tx1"/>
+          </a:fontRef>
+        </p:style>
+      </p:cxnSp>
+      <p:cxnSp>
+        <p:nvCxnSpPr>
+          <p:cNvPr id="95" name="Straight Arrow Connector 94">
+            <a:extLst>
+              <a:ext uri="{FF2B5EF4-FFF2-40B4-BE49-F238E27FC236}">
+                <a16:creationId xmlns:a16="http://schemas.microsoft.com/office/drawing/2014/main" id="{1F08B538-C705-4D30-8DA6-50A6730E0E8A}"/>
+              </a:ext>
+            </a:extLst>
+          </p:cNvPr>
+          <p:cNvCxnSpPr>
+            <a:cxnSpLocks/>
+          </p:cNvCxnSpPr>
+          <p:nvPr/>
+        </p:nvCxnSpPr>
+        <p:spPr>
+          <a:xfrm>
+            <a:off x="2760258" y="1691446"/>
+            <a:ext cx="1254128" cy="0"/>
+          </a:xfrm>
+          <a:prstGeom prst="straightConnector1">
+            <a:avLst/>
+          </a:prstGeom>
+          <a:ln w="19050">
+            <a:solidFill>
+              <a:srgbClr val="0070C0"/>
+            </a:solidFill>
+            <a:tailEnd type="arrow"/>
+          </a:ln>
+        </p:spPr>
+        <p:style>
+          <a:lnRef idx="1">
+            <a:schemeClr val="accent1"/>
+          </a:lnRef>
+          <a:fillRef idx="0">
+            <a:schemeClr val="accent1"/>
+          </a:fillRef>
+          <a:effectRef idx="0">
+            <a:schemeClr val="accent1"/>
+          </a:effectRef>
+          <a:fontRef idx="minor">
+            <a:schemeClr val="tx1"/>
+          </a:fontRef>
+        </p:style>
+      </p:cxnSp>
+      <p:sp>
+        <p:nvSpPr>
+          <p:cNvPr id="97" name="Rectangle 96">
+            <a:extLst>
+              <a:ext uri="{FF2B5EF4-FFF2-40B4-BE49-F238E27FC236}">
+                <a16:creationId xmlns:a16="http://schemas.microsoft.com/office/drawing/2014/main" id="{8DC5CDF4-BB97-426C-9C86-25A5190A89B8}"/>
+              </a:ext>
+            </a:extLst>
+          </p:cNvPr>
+          <p:cNvSpPr/>
+          <p:nvPr/>
+        </p:nvSpPr>
+        <p:spPr>
+          <a:xfrm>
+            <a:off x="4014386" y="1693785"/>
+            <a:ext cx="167174" cy="267012"/>
+          </a:xfrm>
+          <a:prstGeom prst="rect">
+            <a:avLst/>
+          </a:prstGeom>
+          <a:solidFill>
+            <a:srgbClr val="0070C0"/>
+          </a:solidFill>
+          <a:ln>
+            <a:solidFill>
+              <a:srgbClr val="0070C0"/>
+            </a:solidFill>
+          </a:ln>
+          <a:effectLst/>
+        </p:spPr>
+        <p:style>
+          <a:lnRef idx="1">
+            <a:schemeClr val="accent3"/>
+          </a:lnRef>
+          <a:fillRef idx="2">
+            <a:schemeClr val="accent3"/>
+          </a:fillRef>
+          <a:effectRef idx="1">
+            <a:schemeClr val="accent3"/>
+          </a:effectRef>
+          <a:fontRef idx="minor">
+            <a:schemeClr val="dk1"/>
+          </a:fontRef>
+        </p:style>
+        <p:txBody>
+          <a:bodyPr rtlCol="0" anchor="ctr"/>
+          <a:lstStyle/>
+          <a:p>
+            <a:pPr algn="ctr"/>
+            <a:endParaRPr lang="en-SG" sz="1200">
+              <a:solidFill>
+                <a:schemeClr val="dk1"/>
+              </a:solidFill>
+            </a:endParaRPr>
+          </a:p>
+        </p:txBody>
+      </p:sp>
+      <p:cxnSp>
+        <p:nvCxnSpPr>
+          <p:cNvPr id="98" name="Straight Arrow Connector 97">
+            <a:extLst>
+              <a:ext uri="{FF2B5EF4-FFF2-40B4-BE49-F238E27FC236}">
+                <a16:creationId xmlns:a16="http://schemas.microsoft.com/office/drawing/2014/main" id="{FBAC0801-5831-43C0-9663-19871663B17B}"/>
+              </a:ext>
+            </a:extLst>
+          </p:cNvPr>
+          <p:cNvCxnSpPr>
+            <a:cxnSpLocks/>
+          </p:cNvCxnSpPr>
+          <p:nvPr/>
+        </p:nvCxnSpPr>
+        <p:spPr>
+          <a:xfrm flipV="1">
+            <a:off x="2747696" y="1967343"/>
+            <a:ext cx="1297103" cy="394"/>
+          </a:xfrm>
+          <a:prstGeom prst="straightConnector1">
+            <a:avLst/>
+          </a:prstGeom>
+          <a:ln w="19050">
+            <a:solidFill>
+              <a:srgbClr val="0070C0"/>
+            </a:solidFill>
+            <a:prstDash val="sysDash"/>
+            <a:headEnd type="arrow" w="med" len="med"/>
+            <a:tailEnd type="none" w="med" len="med"/>
+          </a:ln>
+        </p:spPr>
+        <p:style>
+          <a:lnRef idx="1">
+            <a:schemeClr val="accent1"/>
+          </a:lnRef>
+          <a:fillRef idx="0">
+            <a:schemeClr val="accent1"/>
+          </a:fillRef>
+          <a:effectRef idx="0">
+            <a:schemeClr val="accent1"/>
+          </a:effectRef>
+          <a:fontRef idx="minor">
+            <a:schemeClr val="tx1"/>
+          </a:fontRef>
+        </p:style>
+      </p:cxnSp>
+      <p:cxnSp>
+        <p:nvCxnSpPr>
+          <p:cNvPr id="101" name="Straight Arrow Connector 100">
+            <a:extLst>
+              <a:ext uri="{FF2B5EF4-FFF2-40B4-BE49-F238E27FC236}">
+                <a16:creationId xmlns:a16="http://schemas.microsoft.com/office/drawing/2014/main" id="{FAFDFF46-AD39-4416-B22D-5487F4BCD6A2}"/>
+              </a:ext>
+            </a:extLst>
+          </p:cNvPr>
+          <p:cNvCxnSpPr>
+            <a:cxnSpLocks/>
+          </p:cNvCxnSpPr>
+          <p:nvPr/>
+        </p:nvCxnSpPr>
+        <p:spPr>
+          <a:xfrm>
+            <a:off x="4192401" y="1777486"/>
+            <a:ext cx="1254128" cy="0"/>
+          </a:xfrm>
+          <a:prstGeom prst="straightConnector1">
+            <a:avLst/>
+          </a:prstGeom>
+          <a:ln w="19050">
+            <a:solidFill>
+              <a:srgbClr val="0070C0"/>
+            </a:solidFill>
+            <a:tailEnd type="arrow"/>
+          </a:ln>
+        </p:spPr>
+        <p:style>
+          <a:lnRef idx="1">
+            <a:schemeClr val="accent1"/>
+          </a:lnRef>
+          <a:fillRef idx="0">
+            <a:schemeClr val="accent1"/>
+          </a:fillRef>
+          <a:effectRef idx="0">
+            <a:schemeClr val="accent1"/>
+          </a:effectRef>
+          <a:fontRef idx="minor">
+            <a:schemeClr val="tx1"/>
+          </a:fontRef>
+        </p:style>
+      </p:cxnSp>
+      <p:cxnSp>
+        <p:nvCxnSpPr>
+          <p:cNvPr id="102" name="Straight Connector 101">
+            <a:extLst>
+              <a:ext uri="{FF2B5EF4-FFF2-40B4-BE49-F238E27FC236}">
+                <a16:creationId xmlns:a16="http://schemas.microsoft.com/office/drawing/2014/main" id="{5F19FC66-42E4-4B93-A18A-D234613542D3}"/>
+              </a:ext>
+            </a:extLst>
+          </p:cNvPr>
+          <p:cNvCxnSpPr>
+            <a:cxnSpLocks/>
+            <a:stCxn id="109" idx="2"/>
+          </p:cNvCxnSpPr>
+          <p:nvPr/>
+        </p:nvCxnSpPr>
+        <p:spPr>
+          <a:xfrm>
+            <a:off x="5525358" y="837592"/>
+            <a:ext cx="1" cy="1721589"/>
+          </a:xfrm>
+          <a:prstGeom prst="line">
+            <a:avLst/>
+          </a:prstGeom>
+          <a:ln w="19050">
+            <a:solidFill>
+              <a:srgbClr val="0070C0"/>
+            </a:solidFill>
+            <a:prstDash val="sysDash"/>
+          </a:ln>
+          <a:effectLst/>
+        </p:spPr>
+        <p:style>
+          <a:lnRef idx="1">
+            <a:schemeClr val="accent1"/>
+          </a:lnRef>
+          <a:fillRef idx="2">
+            <a:schemeClr val="accent1"/>
+          </a:fillRef>
+          <a:effectRef idx="1">
+            <a:schemeClr val="accent1"/>
+          </a:effectRef>
+          <a:fontRef idx="minor">
+            <a:schemeClr val="dk1"/>
+          </a:fontRef>
+        </p:style>
+      </p:cxnSp>
+      <p:sp>
+        <p:nvSpPr>
+          <p:cNvPr id="105" name="Rectangle 104">
+            <a:extLst>
+              <a:ext uri="{FF2B5EF4-FFF2-40B4-BE49-F238E27FC236}">
+                <a16:creationId xmlns:a16="http://schemas.microsoft.com/office/drawing/2014/main" id="{7032D9F4-395B-48A2-BE9F-64162148F117}"/>
+              </a:ext>
+            </a:extLst>
+          </p:cNvPr>
+          <p:cNvSpPr/>
+          <p:nvPr/>
+        </p:nvSpPr>
+        <p:spPr>
+          <a:xfrm>
+            <a:off x="5447092" y="1777486"/>
+            <a:ext cx="176891" cy="120006"/>
+          </a:xfrm>
+          <a:prstGeom prst="rect">
+            <a:avLst/>
+          </a:prstGeom>
+          <a:solidFill>
+            <a:srgbClr val="0070C0"/>
+          </a:solidFill>
+          <a:ln>
+            <a:solidFill>
+              <a:srgbClr val="0070C0"/>
+            </a:solidFill>
+          </a:ln>
+          <a:effectLst/>
+        </p:spPr>
+        <p:style>
+          <a:lnRef idx="1">
+            <a:schemeClr val="accent3"/>
+          </a:lnRef>
+          <a:fillRef idx="2">
+            <a:schemeClr val="accent3"/>
+          </a:fillRef>
+          <a:effectRef idx="1">
+            <a:schemeClr val="accent3"/>
+          </a:effectRef>
+          <a:fontRef idx="minor">
+            <a:schemeClr val="dk1"/>
+          </a:fontRef>
+        </p:style>
+        <p:txBody>
+          <a:bodyPr rtlCol="0" anchor="ctr"/>
+          <a:lstStyle/>
+          <a:p>
+            <a:pPr algn="ctr"/>
+            <a:endParaRPr lang="en-SG" sz="1200">
+              <a:solidFill>
+                <a:schemeClr val="dk1"/>
+              </a:solidFill>
+            </a:endParaRPr>
+          </a:p>
+        </p:txBody>
+      </p:sp>
+      <p:cxnSp>
+        <p:nvCxnSpPr>
+          <p:cNvPr id="106" name="Straight Arrow Connector 105">
+            <a:extLst>
+              <a:ext uri="{FF2B5EF4-FFF2-40B4-BE49-F238E27FC236}">
+                <a16:creationId xmlns:a16="http://schemas.microsoft.com/office/drawing/2014/main" id="{0773530F-A2EF-4C9A-9DDD-BD81F869ECDC}"/>
+              </a:ext>
+            </a:extLst>
+          </p:cNvPr>
+          <p:cNvCxnSpPr>
+            <a:cxnSpLocks/>
+          </p:cNvCxnSpPr>
+          <p:nvPr/>
+        </p:nvCxnSpPr>
+        <p:spPr>
+          <a:xfrm flipV="1">
+            <a:off x="4172909" y="1887753"/>
+            <a:ext cx="1297103" cy="394"/>
+          </a:xfrm>
+          <a:prstGeom prst="straightConnector1">
+            <a:avLst/>
+          </a:prstGeom>
+          <a:ln w="19050">
+            <a:solidFill>
+              <a:srgbClr val="0070C0"/>
+            </a:solidFill>
+            <a:prstDash val="sysDash"/>
+            <a:headEnd type="arrow" w="med" len="med"/>
+            <a:tailEnd type="none" w="med" len="med"/>
+          </a:ln>
+        </p:spPr>
+        <p:style>
+          <a:lnRef idx="1">
+            <a:schemeClr val="accent1"/>
+          </a:lnRef>
+          <a:fillRef idx="0">
+            <a:schemeClr val="accent1"/>
+          </a:fillRef>
+          <a:effectRef idx="0">
+            <a:schemeClr val="accent1"/>
+          </a:effectRef>
+          <a:fontRef idx="minor">
+            <a:schemeClr val="tx1"/>
+          </a:fontRef>
+        </p:style>
+      </p:cxnSp>
+      <p:sp>
+        <p:nvSpPr>
+          <p:cNvPr id="109" name="Rectangle 62">
+            <a:extLst>
+              <a:ext uri="{FF2B5EF4-FFF2-40B4-BE49-F238E27FC236}">
+                <a16:creationId xmlns:a16="http://schemas.microsoft.com/office/drawing/2014/main" id="{850EC75F-E5DD-4309-AD97-C580BE537187}"/>
+              </a:ext>
+            </a:extLst>
+          </p:cNvPr>
+          <p:cNvSpPr/>
+          <p:nvPr/>
+        </p:nvSpPr>
+        <p:spPr>
+          <a:xfrm>
+            <a:off x="4888155" y="347877"/>
+            <a:ext cx="1274405" cy="489715"/>
+          </a:xfrm>
+          <a:prstGeom prst="rect">
+            <a:avLst/>
+          </a:prstGeom>
+          <a:solidFill>
+            <a:srgbClr val="0070C0"/>
+          </a:solidFill>
+          <a:ln w="19050">
+            <a:solidFill>
+              <a:srgbClr val="0070C0"/>
+            </a:solidFill>
+          </a:ln>
+          <a:effectLst/>
+        </p:spPr>
+        <p:style>
+          <a:lnRef idx="1">
+            <a:schemeClr val="accent2"/>
+          </a:lnRef>
+          <a:fillRef idx="2">
+            <a:schemeClr val="accent2"/>
+          </a:fillRef>
+          <a:effectRef idx="1">
+            <a:schemeClr val="accent2"/>
+          </a:effectRef>
+          <a:fontRef idx="minor">
+            <a:schemeClr val="dk1"/>
+          </a:fontRef>
+        </p:style>
+        <p:txBody>
+          <a:bodyPr rtlCol="0" anchor="ctr"/>
+          <a:lstStyle/>
+          <a:p>
+            <a:pPr algn="ctr"/>
+            <a:r>
+              <a:rPr lang="en-US" sz="1200" dirty="0">
+                <a:solidFill>
+                  <a:schemeClr val="bg1"/>
+                </a:solidFill>
+              </a:rPr>
+              <a:t>c:DeleteByDate</a:t>
+            </a:r>
+            <a:br>
+              <a:rPr lang="en-US" sz="1200" dirty="0">
+                <a:solidFill>
+                  <a:schemeClr val="bg1"/>
+                </a:solidFill>
+              </a:rPr>
+            </a:br>
+            <a:r>
+              <a:rPr lang="en-US" sz="1200" dirty="0" err="1">
+                <a:solidFill>
+                  <a:schemeClr val="bg1"/>
+                </a:solidFill>
+              </a:rPr>
+              <a:t>EntryCommand</a:t>
+            </a:r>
+            <a:endParaRPr lang="en-SG" sz="1200" dirty="0">
+              <a:solidFill>
+                <a:schemeClr val="bg1"/>
+              </a:solidFill>
+            </a:endParaRPr>
+          </a:p>
+        </p:txBody>
+      </p:sp>
+      <p:sp>
+        <p:nvSpPr>
+          <p:cNvPr id="49" name="Multiplication Sign 48">
+            <a:extLst>
+              <a:ext uri="{FF2B5EF4-FFF2-40B4-BE49-F238E27FC236}">
+                <a16:creationId xmlns:a16="http://schemas.microsoft.com/office/drawing/2014/main" id="{52D1FF61-66B5-47FB-B454-6B6742646268}"/>
+              </a:ext>
+            </a:extLst>
+          </p:cNvPr>
+          <p:cNvSpPr/>
+          <p:nvPr/>
+        </p:nvSpPr>
+        <p:spPr>
+          <a:xfrm>
+            <a:off x="3956686" y="2062096"/>
+            <a:ext cx="275798" cy="250333"/>
+          </a:xfrm>
+          <a:prstGeom prst="mathMultiply">
+            <a:avLst>
+              <a:gd name="adj1" fmla="val 7539"/>
+            </a:avLst>
+          </a:prstGeom>
+        </p:spPr>
+        <p:style>
+          <a:lnRef idx="2">
+            <a:schemeClr val="accent1">
+              <a:shade val="50000"/>
+            </a:schemeClr>
+          </a:lnRef>
+          <a:fillRef idx="1">
+            <a:schemeClr val="accent1"/>
+          </a:fillRef>
+          <a:effectRef idx="0">
+            <a:schemeClr val="accent1"/>
+          </a:effectRef>
+          <a:fontRef idx="minor">
+            <a:schemeClr val="lt1"/>
+          </a:fontRef>
+        </p:style>
+        <p:txBody>
+          <a:bodyPr rtlCol="0" anchor="ctr"/>
+          <a:lstStyle/>
+          <a:p>
+            <a:pPr algn="ctr"/>
+            <a:endParaRPr lang="en-US"/>
+          </a:p>
+        </p:txBody>
+      </p:sp>
     </p:spTree>
     <p:extLst>
       <p:ext uri="{BB962C8B-B14F-4D97-AF65-F5344CB8AC3E}">

</xml_diff>